<commit_message>
write chapter 11:checkout branch
</commit_message>
<xml_diff>
--- a/pptx/chapter-11.pptx
+++ b/pptx/chapter-11.pptx
@@ -3534,6 +3534,30 @@
           <a:chExt cx="0" cy="0"/>
         </a:xfrm>
       </p:grpSpPr>
+      <p:pic>
+        <p:nvPicPr>
+          <p:cNvPr id="3" name="図 2"/>
+          <p:cNvPicPr>
+            <a:picLocks noChangeAspect="1"/>
+          </p:cNvPicPr>
+          <p:nvPr/>
+        </p:nvPicPr>
+        <p:blipFill>
+          <a:blip r:embed="rId2"/>
+          <a:stretch>
+            <a:fillRect/>
+          </a:stretch>
+        </p:blipFill>
+        <p:spPr>
+          <a:xfrm>
+            <a:off x="2343428" y="1586143"/>
+            <a:ext cx="4457143" cy="3685714"/>
+          </a:xfrm>
+          <a:prstGeom prst="rect">
+            <a:avLst/>
+          </a:prstGeom>
+        </p:spPr>
+      </p:pic>
     </p:spTree>
     <p:extLst>
       <p:ext uri="{BB962C8B-B14F-4D97-AF65-F5344CB8AC3E}">

</xml_diff>